<commit_message>
PPT already up to date
</commit_message>
<xml_diff>
--- a/報告資料/期末報告Python_Movie_RecommerSystem.pptx
+++ b/報告資料/期末報告Python_Movie_RecommerSystem.pptx
@@ -4,6 +4,9 @@
   <p:sldMasterIdLst>
     <p:sldMasterId id="2147483925" r:id="rId1"/>
   </p:sldMasterIdLst>
+  <p:notesMasterIdLst>
+    <p:notesMasterId r:id="rId19"/>
+  </p:notesMasterIdLst>
   <p:sldIdLst>
     <p:sldId id="256" r:id="rId2"/>
     <p:sldId id="257" r:id="rId3"/>
@@ -151,108 +154,6 @@
 
 <file path=ppt/changesInfos/changesInfo1.xml><?xml version="1.0" encoding="utf-8"?>
 <pc:chgInfo xmlns:a="http://schemas.openxmlformats.org/drawingml/2006/main" xmlns:r="http://schemas.openxmlformats.org/officeDocument/2006/relationships" xmlns:ac="http://schemas.microsoft.com/office/drawing/2013/main/command" xmlns:pc="http://schemas.microsoft.com/office/powerpoint/2013/main/command">
-  <pc:docChgLst>
-    <pc:chgData name="謝尚泓" userId="10a1449e-84f2-4b15-a3e3-ff9bf5a03ee1" providerId="ADAL" clId="{E1148309-F924-4E41-9662-EC98BC74992C}"/>
-    <pc:docChg chg="custSel modSld">
-      <pc:chgData name="謝尚泓" userId="10a1449e-84f2-4b15-a3e3-ff9bf5a03ee1" providerId="ADAL" clId="{E1148309-F924-4E41-9662-EC98BC74992C}" dt="2021-06-18T14:03:41.884" v="55" actId="14100"/>
-      <pc:docMkLst>
-        <pc:docMk/>
-      </pc:docMkLst>
-      <pc:sldChg chg="addSp delSp modSp mod">
-        <pc:chgData name="謝尚泓" userId="10a1449e-84f2-4b15-a3e3-ff9bf5a03ee1" providerId="ADAL" clId="{E1148309-F924-4E41-9662-EC98BC74992C}" dt="2021-06-18T14:00:23.626" v="11" actId="1076"/>
-        <pc:sldMkLst>
-          <pc:docMk/>
-          <pc:sldMk cId="3326525695" sldId="262"/>
-        </pc:sldMkLst>
-        <pc:picChg chg="add mod">
-          <ac:chgData name="謝尚泓" userId="10a1449e-84f2-4b15-a3e3-ff9bf5a03ee1" providerId="ADAL" clId="{E1148309-F924-4E41-9662-EC98BC74992C}" dt="2021-06-18T14:00:23.626" v="11" actId="1076"/>
-          <ac:picMkLst>
-            <pc:docMk/>
-            <pc:sldMk cId="3326525695" sldId="262"/>
-            <ac:picMk id="4" creationId="{2A09B06C-AA8E-489A-9F95-5764CDF4C06D}"/>
-          </ac:picMkLst>
-        </pc:picChg>
-        <pc:picChg chg="del">
-          <ac:chgData name="謝尚泓" userId="10a1449e-84f2-4b15-a3e3-ff9bf5a03ee1" providerId="ADAL" clId="{E1148309-F924-4E41-9662-EC98BC74992C}" dt="2021-06-18T13:59:38.271" v="0" actId="478"/>
-          <ac:picMkLst>
-            <pc:docMk/>
-            <pc:sldMk cId="3326525695" sldId="262"/>
-            <ac:picMk id="7" creationId="{F4DF5176-5971-4774-86DE-7B6E0C3820F8}"/>
-          </ac:picMkLst>
-        </pc:picChg>
-      </pc:sldChg>
-      <pc:sldChg chg="addSp delSp modSp mod">
-        <pc:chgData name="謝尚泓" userId="10a1449e-84f2-4b15-a3e3-ff9bf5a03ee1" providerId="ADAL" clId="{E1148309-F924-4E41-9662-EC98BC74992C}" dt="2021-06-18T14:00:55.691" v="21" actId="1076"/>
-        <pc:sldMkLst>
-          <pc:docMk/>
-          <pc:sldMk cId="3489292648" sldId="263"/>
-        </pc:sldMkLst>
-        <pc:picChg chg="add mod">
-          <ac:chgData name="謝尚泓" userId="10a1449e-84f2-4b15-a3e3-ff9bf5a03ee1" providerId="ADAL" clId="{E1148309-F924-4E41-9662-EC98BC74992C}" dt="2021-06-18T14:00:55.691" v="21" actId="1076"/>
-          <ac:picMkLst>
-            <pc:docMk/>
-            <pc:sldMk cId="3489292648" sldId="263"/>
-            <ac:picMk id="4" creationId="{4E4AE825-8596-4F58-8884-E2EF78E4C7B8}"/>
-          </ac:picMkLst>
-        </pc:picChg>
-        <pc:picChg chg="del">
-          <ac:chgData name="謝尚泓" userId="10a1449e-84f2-4b15-a3e3-ff9bf5a03ee1" providerId="ADAL" clId="{E1148309-F924-4E41-9662-EC98BC74992C}" dt="2021-06-18T14:00:32.225" v="12" actId="478"/>
-          <ac:picMkLst>
-            <pc:docMk/>
-            <pc:sldMk cId="3489292648" sldId="263"/>
-            <ac:picMk id="5" creationId="{61447875-22E5-4AB4-B94D-C736BB99F207}"/>
-          </ac:picMkLst>
-        </pc:picChg>
-      </pc:sldChg>
-      <pc:sldChg chg="addSp delSp modSp mod">
-        <pc:chgData name="謝尚泓" userId="10a1449e-84f2-4b15-a3e3-ff9bf5a03ee1" providerId="ADAL" clId="{E1148309-F924-4E41-9662-EC98BC74992C}" dt="2021-06-18T14:03:41.884" v="55" actId="14100"/>
-        <pc:sldMkLst>
-          <pc:docMk/>
-          <pc:sldMk cId="2554308271" sldId="264"/>
-        </pc:sldMkLst>
-        <pc:spChg chg="add mod">
-          <ac:chgData name="謝尚泓" userId="10a1449e-84f2-4b15-a3e3-ff9bf5a03ee1" providerId="ADAL" clId="{E1148309-F924-4E41-9662-EC98BC74992C}" dt="2021-06-18T14:03:35.570" v="54" actId="208"/>
-          <ac:spMkLst>
-            <pc:docMk/>
-            <pc:sldMk cId="2554308271" sldId="264"/>
-            <ac:spMk id="12" creationId="{F41B1304-BBD4-4A90-93AD-C01FA5E78C9C}"/>
-          </ac:spMkLst>
-        </pc:spChg>
-        <pc:picChg chg="add mod">
-          <ac:chgData name="謝尚泓" userId="10a1449e-84f2-4b15-a3e3-ff9bf5a03ee1" providerId="ADAL" clId="{E1148309-F924-4E41-9662-EC98BC74992C}" dt="2021-06-18T14:01:26.955" v="29" actId="1076"/>
-          <ac:picMkLst>
-            <pc:docMk/>
-            <pc:sldMk cId="2554308271" sldId="264"/>
-            <ac:picMk id="4" creationId="{D1290639-2DAA-4412-BA66-338E42AE6E88}"/>
-          </ac:picMkLst>
-        </pc:picChg>
-        <pc:picChg chg="del">
-          <ac:chgData name="謝尚泓" userId="10a1449e-84f2-4b15-a3e3-ff9bf5a03ee1" providerId="ADAL" clId="{E1148309-F924-4E41-9662-EC98BC74992C}" dt="2021-06-18T14:01:03.180" v="22" actId="478"/>
-          <ac:picMkLst>
-            <pc:docMk/>
-            <pc:sldMk cId="2554308271" sldId="264"/>
-            <ac:picMk id="5" creationId="{61447875-22E5-4AB4-B94D-C736BB99F207}"/>
-          </ac:picMkLst>
-        </pc:picChg>
-        <pc:picChg chg="add mod modCrop">
-          <ac:chgData name="謝尚泓" userId="10a1449e-84f2-4b15-a3e3-ff9bf5a03ee1" providerId="ADAL" clId="{E1148309-F924-4E41-9662-EC98BC74992C}" dt="2021-06-18T14:03:41.884" v="55" actId="14100"/>
-          <ac:picMkLst>
-            <pc:docMk/>
-            <pc:sldMk cId="2554308271" sldId="264"/>
-            <ac:picMk id="8" creationId="{D681BEFF-E3E3-4C5F-A801-67F15D2D7C4B}"/>
-          </ac:picMkLst>
-        </pc:picChg>
-        <pc:cxnChg chg="add mod">
-          <ac:chgData name="謝尚泓" userId="10a1449e-84f2-4b15-a3e3-ff9bf5a03ee1" providerId="ADAL" clId="{E1148309-F924-4E41-9662-EC98BC74992C}" dt="2021-06-18T14:02:53.639" v="46" actId="14100"/>
-          <ac:cxnSpMkLst>
-            <pc:docMk/>
-            <pc:sldMk cId="2554308271" sldId="264"/>
-            <ac:cxnSpMk id="10" creationId="{FE3D3141-1353-4A98-B65D-B4BABBA6F3EC}"/>
-          </ac:cxnSpMkLst>
-        </pc:cxnChg>
-      </pc:sldChg>
-    </pc:docChg>
-  </pc:docChgLst>
   <pc:docChgLst>
     <pc:chgData name="謝尚泓" userId="10a1449e-84f2-4b15-a3e3-ff9bf5a03ee1" providerId="ADAL" clId="{59D8694B-E68E-4256-A32C-06AA420CABDF}"/>
     <pc:docChg chg="addSld delSld modSld">
@@ -484,7 +385,559 @@
       </pc:sldChg>
     </pc:docChg>
   </pc:docChgLst>
+  <pc:docChgLst>
+    <pc:chgData name="謝尚泓" userId="10a1449e-84f2-4b15-a3e3-ff9bf5a03ee1" providerId="ADAL" clId="{E1148309-F924-4E41-9662-EC98BC74992C}"/>
+    <pc:docChg chg="custSel modSld">
+      <pc:chgData name="謝尚泓" userId="10a1449e-84f2-4b15-a3e3-ff9bf5a03ee1" providerId="ADAL" clId="{E1148309-F924-4E41-9662-EC98BC74992C}" dt="2021-06-18T14:03:41.884" v="55" actId="14100"/>
+      <pc:docMkLst>
+        <pc:docMk/>
+      </pc:docMkLst>
+      <pc:sldChg chg="addSp delSp modSp mod">
+        <pc:chgData name="謝尚泓" userId="10a1449e-84f2-4b15-a3e3-ff9bf5a03ee1" providerId="ADAL" clId="{E1148309-F924-4E41-9662-EC98BC74992C}" dt="2021-06-18T14:00:23.626" v="11" actId="1076"/>
+        <pc:sldMkLst>
+          <pc:docMk/>
+          <pc:sldMk cId="3326525695" sldId="262"/>
+        </pc:sldMkLst>
+        <pc:picChg chg="add mod">
+          <ac:chgData name="謝尚泓" userId="10a1449e-84f2-4b15-a3e3-ff9bf5a03ee1" providerId="ADAL" clId="{E1148309-F924-4E41-9662-EC98BC74992C}" dt="2021-06-18T14:00:23.626" v="11" actId="1076"/>
+          <ac:picMkLst>
+            <pc:docMk/>
+            <pc:sldMk cId="3326525695" sldId="262"/>
+            <ac:picMk id="4" creationId="{2A09B06C-AA8E-489A-9F95-5764CDF4C06D}"/>
+          </ac:picMkLst>
+        </pc:picChg>
+        <pc:picChg chg="del">
+          <ac:chgData name="謝尚泓" userId="10a1449e-84f2-4b15-a3e3-ff9bf5a03ee1" providerId="ADAL" clId="{E1148309-F924-4E41-9662-EC98BC74992C}" dt="2021-06-18T13:59:38.271" v="0" actId="478"/>
+          <ac:picMkLst>
+            <pc:docMk/>
+            <pc:sldMk cId="3326525695" sldId="262"/>
+            <ac:picMk id="7" creationId="{F4DF5176-5971-4774-86DE-7B6E0C3820F8}"/>
+          </ac:picMkLst>
+        </pc:picChg>
+      </pc:sldChg>
+      <pc:sldChg chg="addSp delSp modSp mod">
+        <pc:chgData name="謝尚泓" userId="10a1449e-84f2-4b15-a3e3-ff9bf5a03ee1" providerId="ADAL" clId="{E1148309-F924-4E41-9662-EC98BC74992C}" dt="2021-06-18T14:00:55.691" v="21" actId="1076"/>
+        <pc:sldMkLst>
+          <pc:docMk/>
+          <pc:sldMk cId="3489292648" sldId="263"/>
+        </pc:sldMkLst>
+        <pc:picChg chg="add mod">
+          <ac:chgData name="謝尚泓" userId="10a1449e-84f2-4b15-a3e3-ff9bf5a03ee1" providerId="ADAL" clId="{E1148309-F924-4E41-9662-EC98BC74992C}" dt="2021-06-18T14:00:55.691" v="21" actId="1076"/>
+          <ac:picMkLst>
+            <pc:docMk/>
+            <pc:sldMk cId="3489292648" sldId="263"/>
+            <ac:picMk id="4" creationId="{4E4AE825-8596-4F58-8884-E2EF78E4C7B8}"/>
+          </ac:picMkLst>
+        </pc:picChg>
+        <pc:picChg chg="del">
+          <ac:chgData name="謝尚泓" userId="10a1449e-84f2-4b15-a3e3-ff9bf5a03ee1" providerId="ADAL" clId="{E1148309-F924-4E41-9662-EC98BC74992C}" dt="2021-06-18T14:00:32.225" v="12" actId="478"/>
+          <ac:picMkLst>
+            <pc:docMk/>
+            <pc:sldMk cId="3489292648" sldId="263"/>
+            <ac:picMk id="5" creationId="{61447875-22E5-4AB4-B94D-C736BB99F207}"/>
+          </ac:picMkLst>
+        </pc:picChg>
+      </pc:sldChg>
+      <pc:sldChg chg="addSp delSp modSp mod">
+        <pc:chgData name="謝尚泓" userId="10a1449e-84f2-4b15-a3e3-ff9bf5a03ee1" providerId="ADAL" clId="{E1148309-F924-4E41-9662-EC98BC74992C}" dt="2021-06-18T14:03:41.884" v="55" actId="14100"/>
+        <pc:sldMkLst>
+          <pc:docMk/>
+          <pc:sldMk cId="2554308271" sldId="264"/>
+        </pc:sldMkLst>
+        <pc:spChg chg="add mod">
+          <ac:chgData name="謝尚泓" userId="10a1449e-84f2-4b15-a3e3-ff9bf5a03ee1" providerId="ADAL" clId="{E1148309-F924-4E41-9662-EC98BC74992C}" dt="2021-06-18T14:03:35.570" v="54" actId="208"/>
+          <ac:spMkLst>
+            <pc:docMk/>
+            <pc:sldMk cId="2554308271" sldId="264"/>
+            <ac:spMk id="12" creationId="{F41B1304-BBD4-4A90-93AD-C01FA5E78C9C}"/>
+          </ac:spMkLst>
+        </pc:spChg>
+        <pc:picChg chg="add mod">
+          <ac:chgData name="謝尚泓" userId="10a1449e-84f2-4b15-a3e3-ff9bf5a03ee1" providerId="ADAL" clId="{E1148309-F924-4E41-9662-EC98BC74992C}" dt="2021-06-18T14:01:26.955" v="29" actId="1076"/>
+          <ac:picMkLst>
+            <pc:docMk/>
+            <pc:sldMk cId="2554308271" sldId="264"/>
+            <ac:picMk id="4" creationId="{D1290639-2DAA-4412-BA66-338E42AE6E88}"/>
+          </ac:picMkLst>
+        </pc:picChg>
+        <pc:picChg chg="del">
+          <ac:chgData name="謝尚泓" userId="10a1449e-84f2-4b15-a3e3-ff9bf5a03ee1" providerId="ADAL" clId="{E1148309-F924-4E41-9662-EC98BC74992C}" dt="2021-06-18T14:01:03.180" v="22" actId="478"/>
+          <ac:picMkLst>
+            <pc:docMk/>
+            <pc:sldMk cId="2554308271" sldId="264"/>
+            <ac:picMk id="5" creationId="{61447875-22E5-4AB4-B94D-C736BB99F207}"/>
+          </ac:picMkLst>
+        </pc:picChg>
+        <pc:picChg chg="add mod modCrop">
+          <ac:chgData name="謝尚泓" userId="10a1449e-84f2-4b15-a3e3-ff9bf5a03ee1" providerId="ADAL" clId="{E1148309-F924-4E41-9662-EC98BC74992C}" dt="2021-06-18T14:03:41.884" v="55" actId="14100"/>
+          <ac:picMkLst>
+            <pc:docMk/>
+            <pc:sldMk cId="2554308271" sldId="264"/>
+            <ac:picMk id="8" creationId="{D681BEFF-E3E3-4C5F-A801-67F15D2D7C4B}"/>
+          </ac:picMkLst>
+        </pc:picChg>
+        <pc:cxnChg chg="add mod">
+          <ac:chgData name="謝尚泓" userId="10a1449e-84f2-4b15-a3e3-ff9bf5a03ee1" providerId="ADAL" clId="{E1148309-F924-4E41-9662-EC98BC74992C}" dt="2021-06-18T14:02:53.639" v="46" actId="14100"/>
+          <ac:cxnSpMkLst>
+            <pc:docMk/>
+            <pc:sldMk cId="2554308271" sldId="264"/>
+            <ac:cxnSpMk id="10" creationId="{FE3D3141-1353-4A98-B65D-B4BABBA6F3EC}"/>
+          </ac:cxnSpMkLst>
+        </pc:cxnChg>
+      </pc:sldChg>
+    </pc:docChg>
+  </pc:docChgLst>
 </pc:chgInfo>
+</file>
+
+<file path=ppt/notesMasters/notesMaster1.xml><?xml version="1.0" encoding="utf-8"?>
+<p:notesMaster xmlns:a="http://schemas.openxmlformats.org/drawingml/2006/main" xmlns:r="http://schemas.openxmlformats.org/officeDocument/2006/relationships" xmlns:p="http://schemas.openxmlformats.org/presentationml/2006/main">
+  <p:cSld>
+    <p:bg>
+      <p:bgRef idx="1001">
+        <a:schemeClr val="bg1"/>
+      </p:bgRef>
+    </p:bg>
+    <p:spTree>
+      <p:nvGrpSpPr>
+        <p:cNvPr id="1" name=""/>
+        <p:cNvGrpSpPr/>
+        <p:nvPr/>
+      </p:nvGrpSpPr>
+      <p:grpSpPr>
+        <a:xfrm>
+          <a:off x="0" y="0"/>
+          <a:ext cx="0" cy="0"/>
+          <a:chOff x="0" y="0"/>
+          <a:chExt cx="0" cy="0"/>
+        </a:xfrm>
+      </p:grpSpPr>
+      <p:sp>
+        <p:nvSpPr>
+          <p:cNvPr id="2" name="頁首版面配置區 1"/>
+          <p:cNvSpPr>
+            <a:spLocks noGrp="1"/>
+          </p:cNvSpPr>
+          <p:nvPr>
+            <p:ph type="hdr" sz="quarter"/>
+          </p:nvPr>
+        </p:nvSpPr>
+        <p:spPr>
+          <a:xfrm>
+            <a:off x="0" y="0"/>
+            <a:ext cx="2971800" cy="458788"/>
+          </a:xfrm>
+          <a:prstGeom prst="rect">
+            <a:avLst/>
+          </a:prstGeom>
+        </p:spPr>
+        <p:txBody>
+          <a:bodyPr vert="horz" lIns="91440" tIns="45720" rIns="91440" bIns="45720" rtlCol="0"/>
+          <a:lstStyle>
+            <a:lvl1pPr algn="l">
+              <a:defRPr sz="1200"/>
+            </a:lvl1pPr>
+          </a:lstStyle>
+          <a:p>
+            <a:endParaRPr lang="zh-TW" altLang="en-US"/>
+          </a:p>
+        </p:txBody>
+      </p:sp>
+      <p:sp>
+        <p:nvSpPr>
+          <p:cNvPr id="3" name="日期版面配置區 2"/>
+          <p:cNvSpPr>
+            <a:spLocks noGrp="1"/>
+          </p:cNvSpPr>
+          <p:nvPr>
+            <p:ph type="dt" idx="1"/>
+          </p:nvPr>
+        </p:nvSpPr>
+        <p:spPr>
+          <a:xfrm>
+            <a:off x="3884613" y="0"/>
+            <a:ext cx="2971800" cy="458788"/>
+          </a:xfrm>
+          <a:prstGeom prst="rect">
+            <a:avLst/>
+          </a:prstGeom>
+        </p:spPr>
+        <p:txBody>
+          <a:bodyPr vert="horz" lIns="91440" tIns="45720" rIns="91440" bIns="45720" rtlCol="0"/>
+          <a:lstStyle>
+            <a:lvl1pPr algn="r">
+              <a:defRPr sz="1200"/>
+            </a:lvl1pPr>
+          </a:lstStyle>
+          <a:p>
+            <a:fld id="{87D1BF43-CD60-4BB6-A88B-E90A78BF9EDB}" type="datetimeFigureOut">
+              <a:rPr lang="zh-TW" altLang="en-US" smtClean="0"/>
+              <a:t>2021/6/19</a:t>
+            </a:fld>
+            <a:endParaRPr lang="zh-TW" altLang="en-US"/>
+          </a:p>
+        </p:txBody>
+      </p:sp>
+      <p:sp>
+        <p:nvSpPr>
+          <p:cNvPr id="4" name="投影片影像版面配置區 3"/>
+          <p:cNvSpPr>
+            <a:spLocks noGrp="1" noRot="1" noChangeAspect="1"/>
+          </p:cNvSpPr>
+          <p:nvPr>
+            <p:ph type="sldImg" idx="2"/>
+          </p:nvPr>
+        </p:nvSpPr>
+        <p:spPr>
+          <a:xfrm>
+            <a:off x="685800" y="1143000"/>
+            <a:ext cx="5486400" cy="3086100"/>
+          </a:xfrm>
+          <a:prstGeom prst="rect">
+            <a:avLst/>
+          </a:prstGeom>
+          <a:noFill/>
+          <a:ln w="12700">
+            <a:solidFill>
+              <a:prstClr val="black"/>
+            </a:solidFill>
+          </a:ln>
+        </p:spPr>
+        <p:txBody>
+          <a:bodyPr vert="horz" lIns="91440" tIns="45720" rIns="91440" bIns="45720" rtlCol="0" anchor="ctr"/>
+          <a:lstStyle/>
+          <a:p>
+            <a:endParaRPr lang="zh-TW" altLang="en-US"/>
+          </a:p>
+        </p:txBody>
+      </p:sp>
+      <p:sp>
+        <p:nvSpPr>
+          <p:cNvPr id="5" name="備忘稿版面配置區 4"/>
+          <p:cNvSpPr>
+            <a:spLocks noGrp="1"/>
+          </p:cNvSpPr>
+          <p:nvPr>
+            <p:ph type="body" sz="quarter" idx="3"/>
+          </p:nvPr>
+        </p:nvSpPr>
+        <p:spPr>
+          <a:xfrm>
+            <a:off x="685800" y="4400550"/>
+            <a:ext cx="5486400" cy="3600450"/>
+          </a:xfrm>
+          <a:prstGeom prst="rect">
+            <a:avLst/>
+          </a:prstGeom>
+        </p:spPr>
+        <p:txBody>
+          <a:bodyPr vert="horz" lIns="91440" tIns="45720" rIns="91440" bIns="45720" rtlCol="0"/>
+          <a:lstStyle/>
+          <a:p>
+            <a:pPr lvl="0"/>
+            <a:r>
+              <a:rPr lang="zh-TW" altLang="en-US"/>
+              <a:t>按一下以編輯母片文字樣式</a:t>
+            </a:r>
+          </a:p>
+          <a:p>
+            <a:pPr lvl="1"/>
+            <a:r>
+              <a:rPr lang="zh-TW" altLang="en-US"/>
+              <a:t>第二層</a:t>
+            </a:r>
+          </a:p>
+          <a:p>
+            <a:pPr lvl="2"/>
+            <a:r>
+              <a:rPr lang="zh-TW" altLang="en-US"/>
+              <a:t>第三層</a:t>
+            </a:r>
+          </a:p>
+          <a:p>
+            <a:pPr lvl="3"/>
+            <a:r>
+              <a:rPr lang="zh-TW" altLang="en-US"/>
+              <a:t>第四層</a:t>
+            </a:r>
+          </a:p>
+          <a:p>
+            <a:pPr lvl="4"/>
+            <a:r>
+              <a:rPr lang="zh-TW" altLang="en-US"/>
+              <a:t>第五層</a:t>
+            </a:r>
+          </a:p>
+        </p:txBody>
+      </p:sp>
+      <p:sp>
+        <p:nvSpPr>
+          <p:cNvPr id="6" name="頁尾版面配置區 5"/>
+          <p:cNvSpPr>
+            <a:spLocks noGrp="1"/>
+          </p:cNvSpPr>
+          <p:nvPr>
+            <p:ph type="ftr" sz="quarter" idx="4"/>
+          </p:nvPr>
+        </p:nvSpPr>
+        <p:spPr>
+          <a:xfrm>
+            <a:off x="0" y="8685213"/>
+            <a:ext cx="2971800" cy="458787"/>
+          </a:xfrm>
+          <a:prstGeom prst="rect">
+            <a:avLst/>
+          </a:prstGeom>
+        </p:spPr>
+        <p:txBody>
+          <a:bodyPr vert="horz" lIns="91440" tIns="45720" rIns="91440" bIns="45720" rtlCol="0" anchor="b"/>
+          <a:lstStyle>
+            <a:lvl1pPr algn="l">
+              <a:defRPr sz="1200"/>
+            </a:lvl1pPr>
+          </a:lstStyle>
+          <a:p>
+            <a:endParaRPr lang="zh-TW" altLang="en-US"/>
+          </a:p>
+        </p:txBody>
+      </p:sp>
+      <p:sp>
+        <p:nvSpPr>
+          <p:cNvPr id="7" name="投影片編號版面配置區 6"/>
+          <p:cNvSpPr>
+            <a:spLocks noGrp="1"/>
+          </p:cNvSpPr>
+          <p:nvPr>
+            <p:ph type="sldNum" sz="quarter" idx="5"/>
+          </p:nvPr>
+        </p:nvSpPr>
+        <p:spPr>
+          <a:xfrm>
+            <a:off x="3884613" y="8685213"/>
+            <a:ext cx="2971800" cy="458787"/>
+          </a:xfrm>
+          <a:prstGeom prst="rect">
+            <a:avLst/>
+          </a:prstGeom>
+        </p:spPr>
+        <p:txBody>
+          <a:bodyPr vert="horz" lIns="91440" tIns="45720" rIns="91440" bIns="45720" rtlCol="0" anchor="b"/>
+          <a:lstStyle>
+            <a:lvl1pPr algn="r">
+              <a:defRPr sz="1200"/>
+            </a:lvl1pPr>
+          </a:lstStyle>
+          <a:p>
+            <a:fld id="{BF575BD5-432F-4E72-8F68-035A95A754E3}" type="slidenum">
+              <a:rPr lang="zh-TW" altLang="en-US" smtClean="0"/>
+              <a:t>‹#›</a:t>
+            </a:fld>
+            <a:endParaRPr lang="zh-TW" altLang="en-US"/>
+          </a:p>
+        </p:txBody>
+      </p:sp>
+    </p:spTree>
+    <p:extLst>
+      <p:ext uri="{BB962C8B-B14F-4D97-AF65-F5344CB8AC3E}">
+        <p14:creationId xmlns:p14="http://schemas.microsoft.com/office/powerpoint/2010/main" val="4280449680"/>
+      </p:ext>
+    </p:extLst>
+  </p:cSld>
+  <p:clrMap bg1="lt1" tx1="dk1" bg2="lt2" tx2="dk2" accent1="accent1" accent2="accent2" accent3="accent3" accent4="accent4" accent5="accent5" accent6="accent6" hlink="hlink" folHlink="folHlink"/>
+  <p:notesStyle>
+    <a:lvl1pPr marL="0" algn="l" defTabSz="914400" rtl="0" eaLnBrk="1" latinLnBrk="0" hangingPunct="1">
+      <a:defRPr sz="1200" kern="1200">
+        <a:solidFill>
+          <a:schemeClr val="tx1"/>
+        </a:solidFill>
+        <a:latin typeface="+mn-lt"/>
+        <a:ea typeface="+mn-ea"/>
+        <a:cs typeface="+mn-cs"/>
+      </a:defRPr>
+    </a:lvl1pPr>
+    <a:lvl2pPr marL="457200" algn="l" defTabSz="914400" rtl="0" eaLnBrk="1" latinLnBrk="0" hangingPunct="1">
+      <a:defRPr sz="1200" kern="1200">
+        <a:solidFill>
+          <a:schemeClr val="tx1"/>
+        </a:solidFill>
+        <a:latin typeface="+mn-lt"/>
+        <a:ea typeface="+mn-ea"/>
+        <a:cs typeface="+mn-cs"/>
+      </a:defRPr>
+    </a:lvl2pPr>
+    <a:lvl3pPr marL="914400" algn="l" defTabSz="914400" rtl="0" eaLnBrk="1" latinLnBrk="0" hangingPunct="1">
+      <a:defRPr sz="1200" kern="1200">
+        <a:solidFill>
+          <a:schemeClr val="tx1"/>
+        </a:solidFill>
+        <a:latin typeface="+mn-lt"/>
+        <a:ea typeface="+mn-ea"/>
+        <a:cs typeface="+mn-cs"/>
+      </a:defRPr>
+    </a:lvl3pPr>
+    <a:lvl4pPr marL="1371600" algn="l" defTabSz="914400" rtl="0" eaLnBrk="1" latinLnBrk="0" hangingPunct="1">
+      <a:defRPr sz="1200" kern="1200">
+        <a:solidFill>
+          <a:schemeClr val="tx1"/>
+        </a:solidFill>
+        <a:latin typeface="+mn-lt"/>
+        <a:ea typeface="+mn-ea"/>
+        <a:cs typeface="+mn-cs"/>
+      </a:defRPr>
+    </a:lvl4pPr>
+    <a:lvl5pPr marL="1828800" algn="l" defTabSz="914400" rtl="0" eaLnBrk="1" latinLnBrk="0" hangingPunct="1">
+      <a:defRPr sz="1200" kern="1200">
+        <a:solidFill>
+          <a:schemeClr val="tx1"/>
+        </a:solidFill>
+        <a:latin typeface="+mn-lt"/>
+        <a:ea typeface="+mn-ea"/>
+        <a:cs typeface="+mn-cs"/>
+      </a:defRPr>
+    </a:lvl5pPr>
+    <a:lvl6pPr marL="2286000" algn="l" defTabSz="914400" rtl="0" eaLnBrk="1" latinLnBrk="0" hangingPunct="1">
+      <a:defRPr sz="1200" kern="1200">
+        <a:solidFill>
+          <a:schemeClr val="tx1"/>
+        </a:solidFill>
+        <a:latin typeface="+mn-lt"/>
+        <a:ea typeface="+mn-ea"/>
+        <a:cs typeface="+mn-cs"/>
+      </a:defRPr>
+    </a:lvl6pPr>
+    <a:lvl7pPr marL="2743200" algn="l" defTabSz="914400" rtl="0" eaLnBrk="1" latinLnBrk="0" hangingPunct="1">
+      <a:defRPr sz="1200" kern="1200">
+        <a:solidFill>
+          <a:schemeClr val="tx1"/>
+        </a:solidFill>
+        <a:latin typeface="+mn-lt"/>
+        <a:ea typeface="+mn-ea"/>
+        <a:cs typeface="+mn-cs"/>
+      </a:defRPr>
+    </a:lvl7pPr>
+    <a:lvl8pPr marL="3200400" algn="l" defTabSz="914400" rtl="0" eaLnBrk="1" latinLnBrk="0" hangingPunct="1">
+      <a:defRPr sz="1200" kern="1200">
+        <a:solidFill>
+          <a:schemeClr val="tx1"/>
+        </a:solidFill>
+        <a:latin typeface="+mn-lt"/>
+        <a:ea typeface="+mn-ea"/>
+        <a:cs typeface="+mn-cs"/>
+      </a:defRPr>
+    </a:lvl8pPr>
+    <a:lvl9pPr marL="3657600" algn="l" defTabSz="914400" rtl="0" eaLnBrk="1" latinLnBrk="0" hangingPunct="1">
+      <a:defRPr sz="1200" kern="1200">
+        <a:solidFill>
+          <a:schemeClr val="tx1"/>
+        </a:solidFill>
+        <a:latin typeface="+mn-lt"/>
+        <a:ea typeface="+mn-ea"/>
+        <a:cs typeface="+mn-cs"/>
+      </a:defRPr>
+    </a:lvl9pPr>
+  </p:notesStyle>
+</p:notesMaster>
+</file>
+
+<file path=ppt/notesSlides/notesSlide1.xml><?xml version="1.0" encoding="utf-8"?>
+<p:notes xmlns:a="http://schemas.openxmlformats.org/drawingml/2006/main" xmlns:r="http://schemas.openxmlformats.org/officeDocument/2006/relationships" xmlns:p="http://schemas.openxmlformats.org/presentationml/2006/main">
+  <p:cSld>
+    <p:spTree>
+      <p:nvGrpSpPr>
+        <p:cNvPr id="1" name=""/>
+        <p:cNvGrpSpPr/>
+        <p:nvPr/>
+      </p:nvGrpSpPr>
+      <p:grpSpPr>
+        <a:xfrm>
+          <a:off x="0" y="0"/>
+          <a:ext cx="0" cy="0"/>
+          <a:chOff x="0" y="0"/>
+          <a:chExt cx="0" cy="0"/>
+        </a:xfrm>
+      </p:grpSpPr>
+      <p:sp>
+        <p:nvSpPr>
+          <p:cNvPr id="2" name="投影片影像版面配置區 1"/>
+          <p:cNvSpPr>
+            <a:spLocks noGrp="1" noRot="1" noChangeAspect="1"/>
+          </p:cNvSpPr>
+          <p:nvPr>
+            <p:ph type="sldImg"/>
+          </p:nvPr>
+        </p:nvSpPr>
+        <p:spPr/>
+      </p:sp>
+      <p:sp>
+        <p:nvSpPr>
+          <p:cNvPr id="3" name="備忘稿版面配置區 2"/>
+          <p:cNvSpPr>
+            <a:spLocks noGrp="1"/>
+          </p:cNvSpPr>
+          <p:nvPr>
+            <p:ph type="body" idx="1"/>
+          </p:nvPr>
+        </p:nvSpPr>
+        <p:spPr/>
+        <p:txBody>
+          <a:bodyPr/>
+          <a:lstStyle/>
+          <a:p>
+            <a:r>
+              <a:rPr lang="zh-TW" altLang="en-US" dirty="0"/>
+              <a:t>資訊太多</a:t>
+            </a:r>
+            <a:endParaRPr lang="en-US" altLang="zh-TW" dirty="0"/>
+          </a:p>
+          <a:p>
+            <a:r>
+              <a:rPr lang="zh-TW" altLang="en-US" dirty="0"/>
+              <a:t>使用者觀看</a:t>
+            </a:r>
+            <a:endParaRPr lang="en-US" altLang="zh-TW" dirty="0"/>
+          </a:p>
+          <a:p>
+            <a:r>
+              <a:rPr lang="zh-TW" altLang="en-US" dirty="0"/>
+              <a:t>片商</a:t>
+            </a:r>
+          </a:p>
+        </p:txBody>
+      </p:sp>
+      <p:sp>
+        <p:nvSpPr>
+          <p:cNvPr id="4" name="投影片編號版面配置區 3"/>
+          <p:cNvSpPr>
+            <a:spLocks noGrp="1"/>
+          </p:cNvSpPr>
+          <p:nvPr>
+            <p:ph type="sldNum" sz="quarter" idx="5"/>
+          </p:nvPr>
+        </p:nvSpPr>
+        <p:spPr/>
+        <p:txBody>
+          <a:bodyPr/>
+          <a:lstStyle/>
+          <a:p>
+            <a:fld id="{BF575BD5-432F-4E72-8F68-035A95A754E3}" type="slidenum">
+              <a:rPr lang="zh-TW" altLang="en-US" smtClean="0"/>
+              <a:t>2</a:t>
+            </a:fld>
+            <a:endParaRPr lang="zh-TW" altLang="en-US"/>
+          </a:p>
+        </p:txBody>
+      </p:sp>
+    </p:spTree>
+    <p:extLst>
+      <p:ext uri="{BB962C8B-B14F-4D97-AF65-F5344CB8AC3E}">
+        <p14:creationId xmlns:p14="http://schemas.microsoft.com/office/powerpoint/2010/main" val="3055331390"/>
+      </p:ext>
+    </p:extLst>
+  </p:cSld>
+  <p:clrMapOvr>
+    <a:masterClrMapping/>
+  </p:clrMapOvr>
+</p:notes>
 </file>
 
 <file path=ppt/slideLayouts/slideLayout1.xml><?xml version="1.0" encoding="utf-8"?>
@@ -3464,8 +3917,8 @@
         </p:nvSpPr>
         <p:spPr>
           <a:xfrm>
-            <a:off x="400849" y="446806"/>
-            <a:ext cx="11390302" cy="1012343"/>
+            <a:off x="1026434" y="953651"/>
+            <a:ext cx="10607462" cy="958789"/>
           </a:xfrm>
         </p:spPr>
         <p:txBody>
@@ -3476,7 +3929,7 @@
           <a:p>
             <a:pPr algn="l"/>
             <a:r>
-              <a:rPr lang="en-US" altLang="zh-TW" sz="6600" dirty="0">
+              <a:rPr lang="en-US" altLang="zh-TW" dirty="0">
                 <a:solidFill>
                   <a:schemeClr val="tx2"/>
                 </a:solidFill>
@@ -3485,7 +3938,7 @@
               </a:rPr>
               <a:t>Movie Recommender System</a:t>
             </a:r>
-            <a:endParaRPr lang="zh-TW" altLang="en-US" sz="6600" dirty="0">
+            <a:endParaRPr lang="zh-TW" altLang="en-US" dirty="0">
               <a:solidFill>
                 <a:schemeClr val="tx2"/>
               </a:solidFill>
@@ -6558,8 +7011,8 @@
         </p:nvSpPr>
         <p:spPr>
           <a:xfrm>
-            <a:off x="3535880" y="1470582"/>
-            <a:ext cx="5438437" cy="2959799"/>
+            <a:off x="3198529" y="1807933"/>
+            <a:ext cx="6123025" cy="2959799"/>
           </a:xfrm>
           <a:prstGeom prst="rect">
             <a:avLst/>
@@ -6623,8 +7076,8 @@
         </p:nvSpPr>
         <p:spPr>
           <a:xfrm>
-            <a:off x="3622292" y="1470582"/>
-            <a:ext cx="5438437" cy="2959799"/>
+            <a:off x="3284941" y="1807933"/>
+            <a:ext cx="6640294" cy="2959799"/>
           </a:xfrm>
           <a:prstGeom prst="rect">
             <a:avLst/>
@@ -10688,4 +11141,299 @@
     </a:ext>
   </a:extLst>
 </a:theme>
+</file>
+
+<file path=ppt/theme/theme2.xml><?xml version="1.0" encoding="utf-8"?>
+<a:theme xmlns:a="http://schemas.openxmlformats.org/drawingml/2006/main" name="Office 佈景主題">
+  <a:themeElements>
+    <a:clrScheme name="Office">
+      <a:dk1>
+        <a:sysClr val="windowText" lastClr="000000"/>
+      </a:dk1>
+      <a:lt1>
+        <a:sysClr val="window" lastClr="FFFFFF"/>
+      </a:lt1>
+      <a:dk2>
+        <a:srgbClr val="44546A"/>
+      </a:dk2>
+      <a:lt2>
+        <a:srgbClr val="E7E6E6"/>
+      </a:lt2>
+      <a:accent1>
+        <a:srgbClr val="4472C4"/>
+      </a:accent1>
+      <a:accent2>
+        <a:srgbClr val="ED7D31"/>
+      </a:accent2>
+      <a:accent3>
+        <a:srgbClr val="A5A5A5"/>
+      </a:accent3>
+      <a:accent4>
+        <a:srgbClr val="FFC000"/>
+      </a:accent4>
+      <a:accent5>
+        <a:srgbClr val="5B9BD5"/>
+      </a:accent5>
+      <a:accent6>
+        <a:srgbClr val="70AD47"/>
+      </a:accent6>
+      <a:hlink>
+        <a:srgbClr val="0563C1"/>
+      </a:hlink>
+      <a:folHlink>
+        <a:srgbClr val="954F72"/>
+      </a:folHlink>
+    </a:clrScheme>
+    <a:fontScheme name="Office">
+      <a:majorFont>
+        <a:latin typeface="Calibri Light" panose="020F0302020204030204"/>
+        <a:ea typeface=""/>
+        <a:cs typeface=""/>
+        <a:font script="Jpan" typeface="游ゴシック Light"/>
+        <a:font script="Hang" typeface="맑은 고딕"/>
+        <a:font script="Hans" typeface="等线 Light"/>
+        <a:font script="Hant" typeface="新細明體"/>
+        <a:font script="Arab" typeface="Times New Roman"/>
+        <a:font script="Hebr" typeface="Times New Roman"/>
+        <a:font script="Thai" typeface="Angsana New"/>
+        <a:font script="Ethi" typeface="Nyala"/>
+        <a:font script="Beng" typeface="Vrinda"/>
+        <a:font script="Gujr" typeface="Shruti"/>
+        <a:font script="Khmr" typeface="MoolBoran"/>
+        <a:font script="Knda" typeface="Tunga"/>
+        <a:font script="Guru" typeface="Raavi"/>
+        <a:font script="Cans" typeface="Euphemia"/>
+        <a:font script="Cher" typeface="Plantagenet Cherokee"/>
+        <a:font script="Yiii" typeface="Microsoft Yi Baiti"/>
+        <a:font script="Tibt" typeface="Microsoft Himalaya"/>
+        <a:font script="Thaa" typeface="MV Boli"/>
+        <a:font script="Deva" typeface="Mangal"/>
+        <a:font script="Telu" typeface="Gautami"/>
+        <a:font script="Taml" typeface="Latha"/>
+        <a:font script="Syrc" typeface="Estrangelo Edessa"/>
+        <a:font script="Orya" typeface="Kalinga"/>
+        <a:font script="Mlym" typeface="Kartika"/>
+        <a:font script="Laoo" typeface="DokChampa"/>
+        <a:font script="Sinh" typeface="Iskoola Pota"/>
+        <a:font script="Mong" typeface="Mongolian Baiti"/>
+        <a:font script="Viet" typeface="Times New Roman"/>
+        <a:font script="Uigh" typeface="Microsoft Uighur"/>
+        <a:font script="Geor" typeface="Sylfaen"/>
+        <a:font script="Armn" typeface="Arial"/>
+        <a:font script="Bugi" typeface="Leelawadee UI"/>
+        <a:font script="Bopo" typeface="Microsoft JhengHei"/>
+        <a:font script="Java" typeface="Javanese Text"/>
+        <a:font script="Lisu" typeface="Segoe UI"/>
+        <a:font script="Mymr" typeface="Myanmar Text"/>
+        <a:font script="Nkoo" typeface="Ebrima"/>
+        <a:font script="Olck" typeface="Nirmala UI"/>
+        <a:font script="Osma" typeface="Ebrima"/>
+        <a:font script="Phag" typeface="Phagspa"/>
+        <a:font script="Syrn" typeface="Estrangelo Edessa"/>
+        <a:font script="Syrj" typeface="Estrangelo Edessa"/>
+        <a:font script="Syre" typeface="Estrangelo Edessa"/>
+        <a:font script="Sora" typeface="Nirmala UI"/>
+        <a:font script="Tale" typeface="Microsoft Tai Le"/>
+        <a:font script="Talu" typeface="Microsoft New Tai Lue"/>
+        <a:font script="Tfng" typeface="Ebrima"/>
+      </a:majorFont>
+      <a:minorFont>
+        <a:latin typeface="Calibri" panose="020F0502020204030204"/>
+        <a:ea typeface=""/>
+        <a:cs typeface=""/>
+        <a:font script="Jpan" typeface="游ゴシック"/>
+        <a:font script="Hang" typeface="맑은 고딕"/>
+        <a:font script="Hans" typeface="等线"/>
+        <a:font script="Hant" typeface="新細明體"/>
+        <a:font script="Arab" typeface="Arial"/>
+        <a:font script="Hebr" typeface="Arial"/>
+        <a:font script="Thai" typeface="Cordia New"/>
+        <a:font script="Ethi" typeface="Nyala"/>
+        <a:font script="Beng" typeface="Vrinda"/>
+        <a:font script="Gujr" typeface="Shruti"/>
+        <a:font script="Khmr" typeface="DaunPenh"/>
+        <a:font script="Knda" typeface="Tunga"/>
+        <a:font script="Guru" typeface="Raavi"/>
+        <a:font script="Cans" typeface="Euphemia"/>
+        <a:font script="Cher" typeface="Plantagenet Cherokee"/>
+        <a:font script="Yiii" typeface="Microsoft Yi Baiti"/>
+        <a:font script="Tibt" typeface="Microsoft Himalaya"/>
+        <a:font script="Thaa" typeface="MV Boli"/>
+        <a:font script="Deva" typeface="Mangal"/>
+        <a:font script="Telu" typeface="Gautami"/>
+        <a:font script="Taml" typeface="Latha"/>
+        <a:font script="Syrc" typeface="Estrangelo Edessa"/>
+        <a:font script="Orya" typeface="Kalinga"/>
+        <a:font script="Mlym" typeface="Kartika"/>
+        <a:font script="Laoo" typeface="DokChampa"/>
+        <a:font script="Sinh" typeface="Iskoola Pota"/>
+        <a:font script="Mong" typeface="Mongolian Baiti"/>
+        <a:font script="Viet" typeface="Arial"/>
+        <a:font script="Uigh" typeface="Microsoft Uighur"/>
+        <a:font script="Geor" typeface="Sylfaen"/>
+        <a:font script="Armn" typeface="Arial"/>
+        <a:font script="Bugi" typeface="Leelawadee UI"/>
+        <a:font script="Bopo" typeface="Microsoft JhengHei"/>
+        <a:font script="Java" typeface="Javanese Text"/>
+        <a:font script="Lisu" typeface="Segoe UI"/>
+        <a:font script="Mymr" typeface="Myanmar Text"/>
+        <a:font script="Nkoo" typeface="Ebrima"/>
+        <a:font script="Olck" typeface="Nirmala UI"/>
+        <a:font script="Osma" typeface="Ebrima"/>
+        <a:font script="Phag" typeface="Phagspa"/>
+        <a:font script="Syrn" typeface="Estrangelo Edessa"/>
+        <a:font script="Syrj" typeface="Estrangelo Edessa"/>
+        <a:font script="Syre" typeface="Estrangelo Edessa"/>
+        <a:font script="Sora" typeface="Nirmala UI"/>
+        <a:font script="Tale" typeface="Microsoft Tai Le"/>
+        <a:font script="Talu" typeface="Microsoft New Tai Lue"/>
+        <a:font script="Tfng" typeface="Ebrima"/>
+      </a:minorFont>
+    </a:fontScheme>
+    <a:fmtScheme name="Office">
+      <a:fillStyleLst>
+        <a:solidFill>
+          <a:schemeClr val="phClr"/>
+        </a:solidFill>
+        <a:gradFill rotWithShape="1">
+          <a:gsLst>
+            <a:gs pos="0">
+              <a:schemeClr val="phClr">
+                <a:lumMod val="110000"/>
+                <a:satMod val="105000"/>
+                <a:tint val="67000"/>
+              </a:schemeClr>
+            </a:gs>
+            <a:gs pos="50000">
+              <a:schemeClr val="phClr">
+                <a:lumMod val="105000"/>
+                <a:satMod val="103000"/>
+                <a:tint val="73000"/>
+              </a:schemeClr>
+            </a:gs>
+            <a:gs pos="100000">
+              <a:schemeClr val="phClr">
+                <a:lumMod val="105000"/>
+                <a:satMod val="109000"/>
+                <a:tint val="81000"/>
+              </a:schemeClr>
+            </a:gs>
+          </a:gsLst>
+          <a:lin ang="5400000" scaled="0"/>
+        </a:gradFill>
+        <a:gradFill rotWithShape="1">
+          <a:gsLst>
+            <a:gs pos="0">
+              <a:schemeClr val="phClr">
+                <a:satMod val="103000"/>
+                <a:lumMod val="102000"/>
+                <a:tint val="94000"/>
+              </a:schemeClr>
+            </a:gs>
+            <a:gs pos="50000">
+              <a:schemeClr val="phClr">
+                <a:satMod val="110000"/>
+                <a:lumMod val="100000"/>
+                <a:shade val="100000"/>
+              </a:schemeClr>
+            </a:gs>
+            <a:gs pos="100000">
+              <a:schemeClr val="phClr">
+                <a:lumMod val="99000"/>
+                <a:satMod val="120000"/>
+                <a:shade val="78000"/>
+              </a:schemeClr>
+            </a:gs>
+          </a:gsLst>
+          <a:lin ang="5400000" scaled="0"/>
+        </a:gradFill>
+      </a:fillStyleLst>
+      <a:lnStyleLst>
+        <a:ln w="6350" cap="flat" cmpd="sng" algn="ctr">
+          <a:solidFill>
+            <a:schemeClr val="phClr"/>
+          </a:solidFill>
+          <a:prstDash val="solid"/>
+          <a:miter lim="800000"/>
+        </a:ln>
+        <a:ln w="12700" cap="flat" cmpd="sng" algn="ctr">
+          <a:solidFill>
+            <a:schemeClr val="phClr"/>
+          </a:solidFill>
+          <a:prstDash val="solid"/>
+          <a:miter lim="800000"/>
+        </a:ln>
+        <a:ln w="19050" cap="flat" cmpd="sng" algn="ctr">
+          <a:solidFill>
+            <a:schemeClr val="phClr"/>
+          </a:solidFill>
+          <a:prstDash val="solid"/>
+          <a:miter lim="800000"/>
+        </a:ln>
+      </a:lnStyleLst>
+      <a:effectStyleLst>
+        <a:effectStyle>
+          <a:effectLst/>
+        </a:effectStyle>
+        <a:effectStyle>
+          <a:effectLst/>
+        </a:effectStyle>
+        <a:effectStyle>
+          <a:effectLst>
+            <a:outerShdw blurRad="57150" dist="19050" dir="5400000" algn="ctr" rotWithShape="0">
+              <a:srgbClr val="000000">
+                <a:alpha val="63000"/>
+              </a:srgbClr>
+            </a:outerShdw>
+          </a:effectLst>
+        </a:effectStyle>
+      </a:effectStyleLst>
+      <a:bgFillStyleLst>
+        <a:solidFill>
+          <a:schemeClr val="phClr"/>
+        </a:solidFill>
+        <a:solidFill>
+          <a:schemeClr val="phClr">
+            <a:tint val="95000"/>
+            <a:satMod val="170000"/>
+          </a:schemeClr>
+        </a:solidFill>
+        <a:gradFill rotWithShape="1">
+          <a:gsLst>
+            <a:gs pos="0">
+              <a:schemeClr val="phClr">
+                <a:tint val="93000"/>
+                <a:satMod val="150000"/>
+                <a:shade val="98000"/>
+                <a:lumMod val="102000"/>
+              </a:schemeClr>
+            </a:gs>
+            <a:gs pos="50000">
+              <a:schemeClr val="phClr">
+                <a:tint val="98000"/>
+                <a:satMod val="130000"/>
+                <a:shade val="90000"/>
+                <a:lumMod val="103000"/>
+              </a:schemeClr>
+            </a:gs>
+            <a:gs pos="100000">
+              <a:schemeClr val="phClr">
+                <a:shade val="63000"/>
+                <a:satMod val="120000"/>
+              </a:schemeClr>
+            </a:gs>
+          </a:gsLst>
+          <a:lin ang="5400000" scaled="0"/>
+        </a:gradFill>
+      </a:bgFillStyleLst>
+    </a:fmtScheme>
+  </a:themeElements>
+  <a:objectDefaults/>
+  <a:extraClrSchemeLst/>
+  <a:extLst>
+    <a:ext uri="{05A4C25C-085E-4340-85A3-A5531E510DB2}">
+      <thm15:themeFamily xmlns:thm15="http://schemas.microsoft.com/office/thememl/2012/main" name="Office Theme" id="{62F939B6-93AF-4DB8-9C6B-D6C7DFDC589F}" vid="{4A3C46E8-61CC-4603-A589-7422A47A8E4A}"/>
+    </a:ext>
+  </a:extLst>
+</a:theme>
 </file>
</xml_diff>